<commit_message>
Fix typo in branching instructions
</commit_message>
<xml_diff>
--- a/Sessions/2020_10_28_collab_code_review.pptx
+++ b/Sessions/2020_10_28_collab_code_review.pptx
@@ -113,6 +113,11 @@
       </a:defRPr>
     </a:lvl9pPr>
   </p:defaultTextStyle>
+  <p:extLst>
+    <p:ext uri="{EFAFB233-063F-42B5-8137-9DF3F51BA10A}">
+      <p15:sldGuideLst xmlns:p15="http://schemas.microsoft.com/office/powerpoint/2012/main"/>
+    </p:ext>
+  </p:extLst>
 </p:presentation>
 </file>
 
@@ -198,7 +203,7 @@
           <a:p>
             <a:fld id="{6E10CB81-9ADD-C14B-8C95-16C33CEDB637}" type="datetimeFigureOut">
               <a:rPr lang="en-US" smtClean="0"/>
-              <a:t>10/26/20</a:t>
+              <a:t>10/28/20</a:t>
             </a:fld>
             <a:endParaRPr lang="en-US"/>
           </a:p>
@@ -1153,7 +1158,7 @@
           <a:p>
             <a:fld id="{F2D0416D-30A0-6844-9A1E-55A87FAF3C45}" type="datetimeFigureOut">
               <a:rPr lang="en-US" smtClean="0"/>
-              <a:t>10/26/20</a:t>
+              <a:t>10/28/20</a:t>
             </a:fld>
             <a:endParaRPr lang="en-US"/>
           </a:p>
@@ -1353,7 +1358,7 @@
           <a:p>
             <a:fld id="{F2D0416D-30A0-6844-9A1E-55A87FAF3C45}" type="datetimeFigureOut">
               <a:rPr lang="en-US" smtClean="0"/>
-              <a:t>10/26/20</a:t>
+              <a:t>10/28/20</a:t>
             </a:fld>
             <a:endParaRPr lang="en-US"/>
           </a:p>
@@ -1563,7 +1568,7 @@
           <a:p>
             <a:fld id="{F2D0416D-30A0-6844-9A1E-55A87FAF3C45}" type="datetimeFigureOut">
               <a:rPr lang="en-US" smtClean="0"/>
-              <a:t>10/26/20</a:t>
+              <a:t>10/28/20</a:t>
             </a:fld>
             <a:endParaRPr lang="en-US"/>
           </a:p>
@@ -1763,7 +1768,7 @@
           <a:p>
             <a:fld id="{F2D0416D-30A0-6844-9A1E-55A87FAF3C45}" type="datetimeFigureOut">
               <a:rPr lang="en-US" smtClean="0"/>
-              <a:t>10/26/20</a:t>
+              <a:t>10/28/20</a:t>
             </a:fld>
             <a:endParaRPr lang="en-US"/>
           </a:p>
@@ -2039,7 +2044,7 @@
           <a:p>
             <a:fld id="{F2D0416D-30A0-6844-9A1E-55A87FAF3C45}" type="datetimeFigureOut">
               <a:rPr lang="en-US" smtClean="0"/>
-              <a:t>10/26/20</a:t>
+              <a:t>10/28/20</a:t>
             </a:fld>
             <a:endParaRPr lang="en-US"/>
           </a:p>
@@ -2307,7 +2312,7 @@
           <a:p>
             <a:fld id="{F2D0416D-30A0-6844-9A1E-55A87FAF3C45}" type="datetimeFigureOut">
               <a:rPr lang="en-US" smtClean="0"/>
-              <a:t>10/26/20</a:t>
+              <a:t>10/28/20</a:t>
             </a:fld>
             <a:endParaRPr lang="en-US"/>
           </a:p>
@@ -2722,7 +2727,7 @@
           <a:p>
             <a:fld id="{F2D0416D-30A0-6844-9A1E-55A87FAF3C45}" type="datetimeFigureOut">
               <a:rPr lang="en-US" smtClean="0"/>
-              <a:t>10/26/20</a:t>
+              <a:t>10/28/20</a:t>
             </a:fld>
             <a:endParaRPr lang="en-US"/>
           </a:p>
@@ -2864,7 +2869,7 @@
           <a:p>
             <a:fld id="{F2D0416D-30A0-6844-9A1E-55A87FAF3C45}" type="datetimeFigureOut">
               <a:rPr lang="en-US" smtClean="0"/>
-              <a:t>10/26/20</a:t>
+              <a:t>10/28/20</a:t>
             </a:fld>
             <a:endParaRPr lang="en-US"/>
           </a:p>
@@ -2977,7 +2982,7 @@
           <a:p>
             <a:fld id="{F2D0416D-30A0-6844-9A1E-55A87FAF3C45}" type="datetimeFigureOut">
               <a:rPr lang="en-US" smtClean="0"/>
-              <a:t>10/26/20</a:t>
+              <a:t>10/28/20</a:t>
             </a:fld>
             <a:endParaRPr lang="en-US"/>
           </a:p>
@@ -3290,7 +3295,7 @@
           <a:p>
             <a:fld id="{F2D0416D-30A0-6844-9A1E-55A87FAF3C45}" type="datetimeFigureOut">
               <a:rPr lang="en-US" smtClean="0"/>
-              <a:t>10/26/20</a:t>
+              <a:t>10/28/20</a:t>
             </a:fld>
             <a:endParaRPr lang="en-US"/>
           </a:p>
@@ -3579,7 +3584,7 @@
           <a:p>
             <a:fld id="{F2D0416D-30A0-6844-9A1E-55A87FAF3C45}" type="datetimeFigureOut">
               <a:rPr lang="en-US" smtClean="0"/>
-              <a:t>10/26/20</a:t>
+              <a:t>10/28/20</a:t>
             </a:fld>
             <a:endParaRPr lang="en-US"/>
           </a:p>
@@ -3822,7 +3827,7 @@
           <a:p>
             <a:fld id="{F2D0416D-30A0-6844-9A1E-55A87FAF3C45}" type="datetimeFigureOut">
               <a:rPr lang="en-US" smtClean="0"/>
-              <a:t>10/26/20</a:t>
+              <a:t>10/28/20</a:t>
             </a:fld>
             <a:endParaRPr lang="en-US"/>
           </a:p>
@@ -13474,11 +13479,16 @@
           </p:cNvGraphicFramePr>
           <p:nvPr>
             <p:ph idx="1"/>
+            <p:extLst>
+              <p:ext uri="{D42A27DB-BD31-4B8C-83A1-F6EECF244321}">
+                <p14:modId xmlns:p14="http://schemas.microsoft.com/office/powerpoint/2010/main" val="2574605407"/>
+              </p:ext>
+            </p:extLst>
           </p:nvPr>
         </p:nvGraphicFramePr>
         <p:xfrm>
           <a:off x="838200" y="149685"/>
-          <a:ext cx="10671313" cy="5924550"/>
+          <a:ext cx="10671313" cy="6251289"/>
         </p:xfrm>
         <a:graphic>
           <a:graphicData uri="http://schemas.openxmlformats.org/drawingml/2006/table">
@@ -13502,7 +13512,7 @@
                   </a:extLst>
                 </a:gridCol>
               </a:tblGrid>
-              <a:tr h="328503">
+              <a:tr h="352138">
                 <a:tc>
                   <a:txBody>
                     <a:bodyPr/>
@@ -13535,7 +13545,7 @@
                   </a:ext>
                 </a:extLst>
               </a:tr>
-              <a:tr h="472870">
+              <a:tr h="455259">
                 <a:tc>
                   <a:txBody>
                     <a:bodyPr/>
@@ -13582,7 +13592,7 @@
                   </a:ext>
                 </a:extLst>
               </a:tr>
-              <a:tr h="574880">
+              <a:tr h="557552">
                 <a:tc>
                   <a:txBody>
                     <a:bodyPr/>
@@ -13618,7 +13628,7 @@
                   </a:ext>
                 </a:extLst>
               </a:tr>
-              <a:tr h="574880">
+              <a:tr h="557552">
                 <a:tc>
                   <a:txBody>
                     <a:bodyPr/>
@@ -13654,7 +13664,7 @@
                   </a:ext>
                 </a:extLst>
               </a:tr>
-              <a:tr h="331010">
+              <a:tr h="352138">
                 <a:tc>
                   <a:txBody>
                     <a:bodyPr/>
@@ -13697,7 +13707,54 @@
                   </a:ext>
                 </a:extLst>
               </a:tr>
-              <a:tr h="331010">
+              <a:tr h="352138">
+                <a:tc>
+                  <a:txBody>
+                    <a:bodyPr/>
+                    <a:lstStyle/>
+                    <a:p>
+                      <a:r>
+                        <a:rPr lang="en-US" i="0" dirty="0">
+                          <a:latin typeface="Consolas" panose="020B0609020204030204" pitchFamily="49" charset="0"/>
+                          <a:cs typeface="Consolas" panose="020B0609020204030204" pitchFamily="49" charset="0"/>
+                        </a:rPr>
+                        <a:t>git add -</a:t>
+                      </a:r>
+                      <a:r>
+                        <a:rPr lang="en-US" i="0" dirty="0" err="1">
+                          <a:latin typeface="Consolas" panose="020B0609020204030204" pitchFamily="49" charset="0"/>
+                          <a:cs typeface="Consolas" panose="020B0609020204030204" pitchFamily="49" charset="0"/>
+                        </a:rPr>
+                        <a:t>i</a:t>
+                      </a:r>
+                      <a:endParaRPr lang="en-US" i="0" dirty="0">
+                        <a:latin typeface="Consolas" panose="020B0609020204030204" pitchFamily="49" charset="0"/>
+                        <a:cs typeface="Consolas" panose="020B0609020204030204" pitchFamily="49" charset="0"/>
+                      </a:endParaRPr>
+                    </a:p>
+                  </a:txBody>
+                  <a:tcPr/>
+                </a:tc>
+                <a:tc>
+                  <a:txBody>
+                    <a:bodyPr/>
+                    <a:lstStyle/>
+                    <a:p>
+                      <a:r>
+                        <a:rPr lang="en-US" sz="1600" dirty="0"/>
+                        <a:t>Modify the staging index</a:t>
+                      </a:r>
+                    </a:p>
+                  </a:txBody>
+                  <a:tcPr/>
+                </a:tc>
+                <a:extLst>
+                  <a:ext uri="{0D108BD9-81ED-4DB2-BD59-A6C34878D82A}">
+                    <a16:rowId xmlns:a16="http://schemas.microsoft.com/office/drawing/2014/main" val="2135923368"/>
+                  </a:ext>
+                </a:extLst>
+              </a:tr>
+              <a:tr h="352138">
                 <a:tc>
                   <a:txBody>
                     <a:bodyPr/>
@@ -13740,7 +13797,7 @@
                   </a:ext>
                 </a:extLst>
               </a:tr>
-              <a:tr h="331010">
+              <a:tr h="352138">
                 <a:tc>
                   <a:txBody>
                     <a:bodyPr/>
@@ -13794,7 +13851,7 @@
                   </a:ext>
                 </a:extLst>
               </a:tr>
-              <a:tr h="574880">
+              <a:tr h="553470">
                 <a:tc>
                   <a:txBody>
                     <a:bodyPr/>
@@ -13837,7 +13894,7 @@
                   </a:ext>
                 </a:extLst>
               </a:tr>
-              <a:tr h="331010">
+              <a:tr h="352138">
                 <a:tc>
                   <a:txBody>
                     <a:bodyPr/>
@@ -13873,7 +13930,7 @@
                   </a:ext>
                 </a:extLst>
               </a:tr>
-              <a:tr h="331010">
+              <a:tr h="352138">
                 <a:tc>
                   <a:txBody>
                     <a:bodyPr/>
@@ -13909,7 +13966,7 @@
                   </a:ext>
                 </a:extLst>
               </a:tr>
-              <a:tr h="331010">
+              <a:tr h="352138">
                 <a:tc>
                   <a:txBody>
                     <a:bodyPr/>
@@ -13952,7 +14009,7 @@
                   </a:ext>
                 </a:extLst>
               </a:tr>
-              <a:tr h="574880">
+              <a:tr h="557552">
                 <a:tc>
                   <a:txBody>
                     <a:bodyPr/>
@@ -13995,7 +14052,7 @@
                   </a:ext>
                 </a:extLst>
               </a:tr>
-              <a:tr h="574880">
+              <a:tr h="557552">
                 <a:tc>
                   <a:txBody>
                     <a:bodyPr/>
@@ -14056,7 +14113,7 @@
         </p:nvSpPr>
         <p:spPr>
           <a:xfrm>
-            <a:off x="838200" y="6338984"/>
+            <a:off x="838200" y="6399944"/>
             <a:ext cx="6311536" cy="369332"/>
           </a:xfrm>
           <a:prstGeom prst="rect">

</xml_diff>